<commit_message>
Visualization done. Add details to presentation.
</commit_message>
<xml_diff>
--- a/presentation.pptx
+++ b/presentation.pptx
@@ -10,6 +10,12 @@
     <p:sldId id="258" r:id="rId4"/>
     <p:sldId id="259" r:id="rId5"/>
     <p:sldId id="260" r:id="rId6"/>
+    <p:sldId id="261" r:id="rId7"/>
+    <p:sldId id="262" r:id="rId8"/>
+    <p:sldId id="263" r:id="rId9"/>
+    <p:sldId id="264" r:id="rId10"/>
+    <p:sldId id="265" r:id="rId11"/>
+    <p:sldId id="266" r:id="rId12"/>
   </p:sldIdLst>
   <p:sldSz cx="9144000" cy="5143500" type="screen16x9"/>
   <p:notesSz cx="6858000" cy="9144000"/>
@@ -3176,11 +3182,195 @@
             </a:pPr>
             <a:r>
               <a:rPr/>
-              <a:t>2025-01-09</a:t>
-            </a:r>
-          </a:p>
-        </p:txBody>
-      </p:sp>
+              <a:t>2025-01-14</a:t>
+            </a:r>
+          </a:p>
+        </p:txBody>
+      </p:sp>
+    </p:spTree>
+  </p:cSld>
+</p:sld>
+</file>
+
+<file path=ppt/slides/slide10.xml><?xml version="1.0" encoding="utf-8"?>
+<p:sld xmlns:a="http://schemas.openxmlformats.org/drawingml/2006/main" xmlns:r="http://schemas.openxmlformats.org/officeDocument/2006/relationships" xmlns:p="http://schemas.openxmlformats.org/presentationml/2006/main">
+  <p:cSld>
+    <p:spTree>
+      <p:nvGrpSpPr>
+        <p:cNvPr id="1" name=""/>
+        <p:cNvGrpSpPr/>
+        <p:nvPr/>
+      </p:nvGrpSpPr>
+      <p:grpSpPr>
+        <a:xfrm>
+          <a:off x="0" y="0"/>
+          <a:ext cx="0" cy="0"/>
+          <a:chOff x="0" y="0"/>
+          <a:chExt cx="0" cy="0"/>
+        </a:xfrm>
+      </p:grpSpPr>
+      <p:sp>
+        <p:nvSpPr>
+          <p:cNvPr id="2" name="Title 1"/>
+          <p:cNvSpPr>
+            <a:spLocks noGrp="1"/>
+          </p:cNvSpPr>
+          <p:nvPr>
+            <p:ph type="title"/>
+          </p:nvPr>
+        </p:nvSpPr>
+        <p:spPr/>
+        <p:txBody>
+          <a:bodyPr/>
+          <a:lstStyle/>
+          <a:p>
+            <a:pPr lvl="0" indent="0" marL="0">
+              <a:buNone/>
+            </a:pPr>
+            <a:r>
+              <a:rPr/>
+              <a:t>ASMR2020</a:t>
+            </a:r>
+          </a:p>
+        </p:txBody>
+      </p:sp>
+      <p:pic>
+        <p:nvPicPr>
+          <p:cNvPr descr="presentation_files/figure-pptx/unnamed-chunk-7-1.png" id="0" name="Picture 1"/>
+          <p:cNvPicPr>
+            <a:picLocks noGrp="1" noChangeAspect="1"/>
+          </p:cNvPicPr>
+          <p:nvPr/>
+        </p:nvPicPr>
+        <p:blipFill>
+          <a:blip r:embed="rId2"/>
+          <a:stretch>
+            <a:fillRect/>
+          </a:stretch>
+        </p:blipFill>
+        <p:spPr bwMode="auto">
+          <a:xfrm>
+            <a:off x="2451100" y="1193800"/>
+            <a:ext cx="4241800" cy="3390900"/>
+          </a:xfrm>
+          <a:prstGeom prst="rect">
+            <a:avLst/>
+          </a:prstGeom>
+          <a:noFill/>
+          <a:ln w="9525">
+            <a:noFill/>
+            <a:headEnd/>
+            <a:tailEnd/>
+          </a:ln>
+        </p:spPr>
+      </p:pic>
+    </p:spTree>
+  </p:cSld>
+</p:sld>
+</file>
+
+<file path=ppt/slides/slide11.xml><?xml version="1.0" encoding="utf-8"?>
+<p:sld xmlns:a="http://schemas.openxmlformats.org/drawingml/2006/main" xmlns:r="http://schemas.openxmlformats.org/officeDocument/2006/relationships" xmlns:p="http://schemas.openxmlformats.org/presentationml/2006/main">
+  <p:cSld>
+    <p:spTree>
+      <p:nvGrpSpPr>
+        <p:cNvPr id="1" name=""/>
+        <p:cNvGrpSpPr/>
+        <p:nvPr/>
+      </p:nvGrpSpPr>
+      <p:grpSpPr>
+        <a:xfrm>
+          <a:off x="0" y="0"/>
+          <a:ext cx="0" cy="0"/>
+          <a:chOff x="0" y="0"/>
+          <a:chExt cx="0" cy="0"/>
+        </a:xfrm>
+      </p:grpSpPr>
+      <p:sp>
+        <p:nvSpPr>
+          <p:cNvPr id="2" name="Title 1"/>
+          <p:cNvSpPr>
+            <a:spLocks noGrp="1"/>
+          </p:cNvSpPr>
+          <p:nvPr>
+            <p:ph type="title"/>
+          </p:nvPr>
+        </p:nvSpPr>
+        <p:spPr/>
+        <p:txBody>
+          <a:bodyPr/>
+          <a:lstStyle/>
+          <a:p>
+            <a:pPr lvl="0" indent="0" marL="0">
+              <a:buNone/>
+            </a:pPr>
+            <a:r>
+              <a:rPr/>
+              <a:t>other rates</a:t>
+            </a:r>
+          </a:p>
+        </p:txBody>
+      </p:sp>
+      <p:pic>
+        <p:nvPicPr>
+          <p:cNvPr descr="presentation_files/figure-pptx/unnamed-chunk-8-1.png" id="0" name="Picture 1"/>
+          <p:cNvPicPr>
+            <a:picLocks noGrp="1" noChangeAspect="1"/>
+          </p:cNvPicPr>
+          <p:nvPr/>
+        </p:nvPicPr>
+        <p:blipFill>
+          <a:blip r:embed="rId2"/>
+          <a:stretch>
+            <a:fillRect/>
+          </a:stretch>
+        </p:blipFill>
+        <p:spPr bwMode="auto">
+          <a:xfrm>
+            <a:off x="457200" y="1270000"/>
+            <a:ext cx="4038600" cy="3225800"/>
+          </a:xfrm>
+          <a:prstGeom prst="rect">
+            <a:avLst/>
+          </a:prstGeom>
+          <a:noFill/>
+          <a:ln w="9525">
+            <a:noFill/>
+            <a:headEnd/>
+            <a:tailEnd/>
+          </a:ln>
+        </p:spPr>
+      </p:pic>
+      <p:pic>
+        <p:nvPicPr>
+          <p:cNvPr descr="presentation_files/figure-pptx/unnamed-chunk-9-1.png" id="0" name="Picture 1"/>
+          <p:cNvPicPr>
+            <a:picLocks noGrp="1" noChangeAspect="1"/>
+          </p:cNvPicPr>
+          <p:nvPr/>
+        </p:nvPicPr>
+        <p:blipFill>
+          <a:blip r:embed="rId3"/>
+          <a:stretch>
+            <a:fillRect/>
+          </a:stretch>
+        </p:blipFill>
+        <p:spPr bwMode="auto">
+          <a:xfrm>
+            <a:off x="4648200" y="1270000"/>
+            <a:ext cx="4038600" cy="3225800"/>
+          </a:xfrm>
+          <a:prstGeom prst="rect">
+            <a:avLst/>
+          </a:prstGeom>
+          <a:noFill/>
+          <a:ln w="9525">
+            <a:noFill/>
+            <a:headEnd/>
+            <a:tailEnd/>
+          </a:ln>
+        </p:spPr>
+      </p:pic>
     </p:spTree>
   </p:cSld>
 </p:sld>
@@ -3494,6 +3684,374 @@
           <a:xfrm>
             <a:off x="2451100" y="1193800"/>
             <a:ext cx="4241800" cy="3390900"/>
+          </a:xfrm>
+          <a:prstGeom prst="rect">
+            <a:avLst/>
+          </a:prstGeom>
+          <a:noFill/>
+          <a:ln w="9525">
+            <a:noFill/>
+            <a:headEnd/>
+            <a:tailEnd/>
+          </a:ln>
+        </p:spPr>
+      </p:pic>
+    </p:spTree>
+  </p:cSld>
+</p:sld>
+</file>
+
+<file path=ppt/slides/slide6.xml><?xml version="1.0" encoding="utf-8"?>
+<p:sld xmlns:a="http://schemas.openxmlformats.org/drawingml/2006/main" xmlns:r="http://schemas.openxmlformats.org/officeDocument/2006/relationships" xmlns:p="http://schemas.openxmlformats.org/presentationml/2006/main">
+  <p:cSld>
+    <p:spTree>
+      <p:nvGrpSpPr>
+        <p:cNvPr id="1" name=""/>
+        <p:cNvGrpSpPr/>
+        <p:nvPr/>
+      </p:nvGrpSpPr>
+      <p:grpSpPr>
+        <a:xfrm>
+          <a:off x="0" y="0"/>
+          <a:ext cx="0" cy="0"/>
+          <a:chOff x="0" y="0"/>
+          <a:chExt cx="0" cy="0"/>
+        </a:xfrm>
+      </p:grpSpPr>
+      <p:sp>
+        <p:nvSpPr>
+          <p:cNvPr id="2" name="Title 1"/>
+          <p:cNvSpPr>
+            <a:spLocks noGrp="1"/>
+          </p:cNvSpPr>
+          <p:nvPr>
+            <p:ph type="title"/>
+          </p:nvPr>
+        </p:nvSpPr>
+        <p:spPr/>
+        <p:txBody>
+          <a:bodyPr/>
+          <a:lstStyle/>
+          <a:p>
+            <a:pPr lvl="0" indent="0" marL="0">
+              <a:buNone/>
+            </a:pPr>
+            <a:r>
+              <a:rPr/>
+              <a:t>Dependency Ratio</a:t>
+            </a:r>
+          </a:p>
+        </p:txBody>
+      </p:sp>
+      <p:pic>
+        <p:nvPicPr>
+          <p:cNvPr descr="presentation_files/figure-pptx/unnamed-chunk-1-1.png" id="0" name="Picture 1"/>
+          <p:cNvPicPr>
+            <a:picLocks noGrp="1" noChangeAspect="1"/>
+          </p:cNvPicPr>
+          <p:nvPr/>
+        </p:nvPicPr>
+        <p:blipFill>
+          <a:blip r:embed="rId2"/>
+          <a:stretch>
+            <a:fillRect/>
+          </a:stretch>
+        </p:blipFill>
+        <p:spPr bwMode="auto">
+          <a:xfrm>
+            <a:off x="2451100" y="1193800"/>
+            <a:ext cx="4241800" cy="3390900"/>
+          </a:xfrm>
+          <a:prstGeom prst="rect">
+            <a:avLst/>
+          </a:prstGeom>
+          <a:noFill/>
+          <a:ln w="9525">
+            <a:noFill/>
+            <a:headEnd/>
+            <a:tailEnd/>
+          </a:ln>
+        </p:spPr>
+      </p:pic>
+    </p:spTree>
+  </p:cSld>
+</p:sld>
+</file>
+
+<file path=ppt/slides/slide7.xml><?xml version="1.0" encoding="utf-8"?>
+<p:sld xmlns:a="http://schemas.openxmlformats.org/drawingml/2006/main" xmlns:r="http://schemas.openxmlformats.org/officeDocument/2006/relationships" xmlns:p="http://schemas.openxmlformats.org/presentationml/2006/main">
+  <p:cSld>
+    <p:spTree>
+      <p:nvGrpSpPr>
+        <p:cNvPr id="1" name=""/>
+        <p:cNvGrpSpPr/>
+        <p:nvPr/>
+      </p:nvGrpSpPr>
+      <p:grpSpPr>
+        <a:xfrm>
+          <a:off x="0" y="0"/>
+          <a:ext cx="0" cy="0"/>
+          <a:chOff x="0" y="0"/>
+          <a:chExt cx="0" cy="0"/>
+        </a:xfrm>
+      </p:grpSpPr>
+      <p:sp>
+        <p:nvSpPr>
+          <p:cNvPr id="2" name="Title 1"/>
+          <p:cNvSpPr>
+            <a:spLocks noGrp="1"/>
+          </p:cNvSpPr>
+          <p:nvPr>
+            <p:ph type="title"/>
+          </p:nvPr>
+        </p:nvSpPr>
+        <p:spPr/>
+        <p:txBody>
+          <a:bodyPr/>
+          <a:lstStyle/>
+          <a:p>
+            <a:pPr lvl="0" indent="0" marL="0">
+              <a:buNone/>
+            </a:pPr>
+            <a:r>
+              <a:rPr/>
+              <a:t>Dependency Ratio 2023</a:t>
+            </a:r>
+          </a:p>
+        </p:txBody>
+      </p:sp>
+      <p:pic>
+        <p:nvPicPr>
+          <p:cNvPr descr="presentation_files/figure-pptx/unnamed-chunk-2-1.png" id="0" name="Picture 1"/>
+          <p:cNvPicPr>
+            <a:picLocks noGrp="1" noChangeAspect="1"/>
+          </p:cNvPicPr>
+          <p:nvPr/>
+        </p:nvPicPr>
+        <p:blipFill>
+          <a:blip r:embed="rId2"/>
+          <a:stretch>
+            <a:fillRect/>
+          </a:stretch>
+        </p:blipFill>
+        <p:spPr bwMode="auto">
+          <a:xfrm>
+            <a:off x="457200" y="1270000"/>
+            <a:ext cx="4038600" cy="3225800"/>
+          </a:xfrm>
+          <a:prstGeom prst="rect">
+            <a:avLst/>
+          </a:prstGeom>
+          <a:noFill/>
+          <a:ln w="9525">
+            <a:noFill/>
+            <a:headEnd/>
+            <a:tailEnd/>
+          </a:ln>
+        </p:spPr>
+      </p:pic>
+      <p:pic>
+        <p:nvPicPr>
+          <p:cNvPr descr="presentation_files/figure-pptx/unnamed-chunk-3-1.png" id="0" name="Picture 1"/>
+          <p:cNvPicPr>
+            <a:picLocks noGrp="1" noChangeAspect="1"/>
+          </p:cNvPicPr>
+          <p:nvPr/>
+        </p:nvPicPr>
+        <p:blipFill>
+          <a:blip r:embed="rId3"/>
+          <a:stretch>
+            <a:fillRect/>
+          </a:stretch>
+        </p:blipFill>
+        <p:spPr bwMode="auto">
+          <a:xfrm>
+            <a:off x="4648200" y="1270000"/>
+            <a:ext cx="4038600" cy="3225800"/>
+          </a:xfrm>
+          <a:prstGeom prst="rect">
+            <a:avLst/>
+          </a:prstGeom>
+          <a:noFill/>
+          <a:ln w="9525">
+            <a:noFill/>
+            <a:headEnd/>
+            <a:tailEnd/>
+          </a:ln>
+        </p:spPr>
+      </p:pic>
+    </p:spTree>
+  </p:cSld>
+</p:sld>
+</file>
+
+<file path=ppt/slides/slide8.xml><?xml version="1.0" encoding="utf-8"?>
+<p:sld xmlns:a="http://schemas.openxmlformats.org/drawingml/2006/main" xmlns:r="http://schemas.openxmlformats.org/officeDocument/2006/relationships" xmlns:p="http://schemas.openxmlformats.org/presentationml/2006/main">
+  <p:cSld>
+    <p:spTree>
+      <p:nvGrpSpPr>
+        <p:cNvPr id="1" name=""/>
+        <p:cNvGrpSpPr/>
+        <p:nvPr/>
+      </p:nvGrpSpPr>
+      <p:grpSpPr>
+        <a:xfrm>
+          <a:off x="0" y="0"/>
+          <a:ext cx="0" cy="0"/>
+          <a:chOff x="0" y="0"/>
+          <a:chExt cx="0" cy="0"/>
+        </a:xfrm>
+      </p:grpSpPr>
+      <p:sp>
+        <p:nvSpPr>
+          <p:cNvPr id="2" name="Title 1"/>
+          <p:cNvSpPr>
+            <a:spLocks noGrp="1"/>
+          </p:cNvSpPr>
+          <p:nvPr>
+            <p:ph type="title"/>
+          </p:nvPr>
+        </p:nvSpPr>
+        <p:spPr/>
+        <p:txBody>
+          <a:bodyPr/>
+          <a:lstStyle/>
+          <a:p>
+            <a:pPr lvl="0" indent="0" marL="0">
+              <a:buNone/>
+            </a:pPr>
+            <a:r>
+              <a:rPr/>
+              <a:t>Historical Age Categories 2023</a:t>
+            </a:r>
+          </a:p>
+        </p:txBody>
+      </p:sp>
+      <p:pic>
+        <p:nvPicPr>
+          <p:cNvPr descr="presentation_files/figure-pptx/unnamed-chunk-4-1.png" id="0" name="Picture 1"/>
+          <p:cNvPicPr>
+            <a:picLocks noGrp="1" noChangeAspect="1"/>
+          </p:cNvPicPr>
+          <p:nvPr/>
+        </p:nvPicPr>
+        <p:blipFill>
+          <a:blip r:embed="rId2"/>
+          <a:stretch>
+            <a:fillRect/>
+          </a:stretch>
+        </p:blipFill>
+        <p:spPr bwMode="auto">
+          <a:xfrm>
+            <a:off x="2451100" y="1193800"/>
+            <a:ext cx="4241800" cy="3390900"/>
+          </a:xfrm>
+          <a:prstGeom prst="rect">
+            <a:avLst/>
+          </a:prstGeom>
+          <a:noFill/>
+          <a:ln w="9525">
+            <a:noFill/>
+            <a:headEnd/>
+            <a:tailEnd/>
+          </a:ln>
+        </p:spPr>
+      </p:pic>
+    </p:spTree>
+  </p:cSld>
+</p:sld>
+</file>
+
+<file path=ppt/slides/slide9.xml><?xml version="1.0" encoding="utf-8"?>
+<p:sld xmlns:a="http://schemas.openxmlformats.org/drawingml/2006/main" xmlns:r="http://schemas.openxmlformats.org/officeDocument/2006/relationships" xmlns:p="http://schemas.openxmlformats.org/presentationml/2006/main">
+  <p:cSld>
+    <p:spTree>
+      <p:nvGrpSpPr>
+        <p:cNvPr id="1" name=""/>
+        <p:cNvGrpSpPr/>
+        <p:nvPr/>
+      </p:nvGrpSpPr>
+      <p:grpSpPr>
+        <a:xfrm>
+          <a:off x="0" y="0"/>
+          <a:ext cx="0" cy="0"/>
+          <a:chOff x="0" y="0"/>
+          <a:chExt cx="0" cy="0"/>
+        </a:xfrm>
+      </p:grpSpPr>
+      <p:sp>
+        <p:nvSpPr>
+          <p:cNvPr id="2" name="Title 1"/>
+          <p:cNvSpPr>
+            <a:spLocks noGrp="1"/>
+          </p:cNvSpPr>
+          <p:nvPr>
+            <p:ph type="title"/>
+          </p:nvPr>
+        </p:nvSpPr>
+        <p:spPr/>
+        <p:txBody>
+          <a:bodyPr/>
+          <a:lstStyle/>
+          <a:p>
+            <a:pPr lvl="0" indent="0" marL="0">
+              <a:buNone/>
+            </a:pPr>
+            <a:r>
+              <a:rPr/>
+              <a:t>Historical Age Categories 2023</a:t>
+            </a:r>
+          </a:p>
+        </p:txBody>
+      </p:sp>
+      <p:pic>
+        <p:nvPicPr>
+          <p:cNvPr descr="presentation_files/figure-pptx/unnamed-chunk-5-1.png" id="0" name="Picture 1"/>
+          <p:cNvPicPr>
+            <a:picLocks noGrp="1" noChangeAspect="1"/>
+          </p:cNvPicPr>
+          <p:nvPr/>
+        </p:nvPicPr>
+        <p:blipFill>
+          <a:blip r:embed="rId2"/>
+          <a:stretch>
+            <a:fillRect/>
+          </a:stretch>
+        </p:blipFill>
+        <p:spPr bwMode="auto">
+          <a:xfrm>
+            <a:off x="457200" y="1270000"/>
+            <a:ext cx="4038600" cy="3225800"/>
+          </a:xfrm>
+          <a:prstGeom prst="rect">
+            <a:avLst/>
+          </a:prstGeom>
+          <a:noFill/>
+          <a:ln w="9525">
+            <a:noFill/>
+            <a:headEnd/>
+            <a:tailEnd/>
+          </a:ln>
+        </p:spPr>
+      </p:pic>
+      <p:pic>
+        <p:nvPicPr>
+          <p:cNvPr descr="presentation_files/figure-pptx/unnamed-chunk-6-1.png" id="0" name="Picture 1"/>
+          <p:cNvPicPr>
+            <a:picLocks noGrp="1" noChangeAspect="1"/>
+          </p:cNvPicPr>
+          <p:nvPr/>
+        </p:nvPicPr>
+        <p:blipFill>
+          <a:blip r:embed="rId3"/>
+          <a:stretch>
+            <a:fillRect/>
+          </a:stretch>
+        </p:blipFill>
+        <p:spPr bwMode="auto">
+          <a:xfrm>
+            <a:off x="4648200" y="1270000"/>
+            <a:ext cx="4038600" cy="3225800"/>
           </a:xfrm>
           <a:prstGeom prst="rect">
             <a:avLst/>

</xml_diff>